<commit_message>
changes and Projects for econ 470
</commit_message>
<xml_diff>
--- a/jdocs/Stats/Chapter 0_Roadmap.pptx
+++ b/jdocs/Stats/Chapter 0_Roadmap.pptx
@@ -257,7 +257,7 @@
             <a:fld id="{3D064D1C-C877-48D9-8271-180C8DE21D00}" type="datetime4">
               <a:rPr lang="zh-CN" altLang="en-US"/>
               <a:pPr/>
-              <a:t>2013年10月29日星期二</a:t>
+              <a:t>2015年1月22日星期四</a:t>
             </a:fld>
             <a:endParaRPr lang="en-US" altLang="zh-CN"/>
           </a:p>
@@ -484,7 +484,7 @@
             <a:fld id="{58489A5C-8620-4F00-9526-7134053D99E2}" type="datetime4">
               <a:rPr lang="zh-CN" altLang="en-US"/>
               <a:pPr/>
-              <a:t>2013年10月29日星期二</a:t>
+              <a:t>2015年1月22日星期四</a:t>
             </a:fld>
             <a:endParaRPr lang="en-US" altLang="zh-CN"/>
           </a:p>
@@ -1002,7 +1002,7 @@
             <a:fld id="{26B9E577-8BF9-4D41-81ED-A1B8D3AB8426}" type="datetime1">
               <a:rPr lang="en-US" altLang="zh-CN" smtClean="0"/>
               <a:pPr/>
-              <a:t>10/29/2013</a:t>
+              <a:t>1/22/2015</a:t>
             </a:fld>
             <a:endParaRPr lang="en-US" altLang="zh-CN"/>
           </a:p>
@@ -1177,7 +1177,7 @@
             <a:fld id="{01BD82F0-5B71-435D-937C-050D8F621DD4}" type="datetime1">
               <a:rPr lang="en-US" altLang="zh-CN" smtClean="0"/>
               <a:pPr/>
-              <a:t>10/29/2013</a:t>
+              <a:t>1/22/2015</a:t>
             </a:fld>
             <a:endParaRPr lang="en-US" altLang="zh-CN"/>
           </a:p>
@@ -1362,7 +1362,7 @@
             <a:fld id="{0C1D6B7F-8544-4DAE-BF85-48143DA13BE7}" type="datetime1">
               <a:rPr lang="en-US" altLang="zh-CN" smtClean="0"/>
               <a:pPr/>
-              <a:t>10/29/2013</a:t>
+              <a:t>1/22/2015</a:t>
             </a:fld>
             <a:endParaRPr lang="en-US" altLang="zh-CN"/>
           </a:p>
@@ -1537,7 +1537,7 @@
             <a:fld id="{3E03678E-6F1D-45F3-B638-C4A5654FD474}" type="datetime1">
               <a:rPr lang="en-US" altLang="zh-CN" smtClean="0"/>
               <a:pPr/>
-              <a:t>10/29/2013</a:t>
+              <a:t>1/22/2015</a:t>
             </a:fld>
             <a:endParaRPr lang="en-US" altLang="zh-CN"/>
           </a:p>
@@ -1788,7 +1788,7 @@
             <a:fld id="{1D03C169-6974-4B3A-AC45-4FDBE774F09C}" type="datetime1">
               <a:rPr lang="en-US" altLang="zh-CN" smtClean="0"/>
               <a:pPr/>
-              <a:t>10/29/2013</a:t>
+              <a:t>1/22/2015</a:t>
             </a:fld>
             <a:endParaRPr lang="en-US" altLang="zh-CN"/>
           </a:p>
@@ -2081,7 +2081,7 @@
             <a:fld id="{2405320A-F880-4535-BFBA-6C2292428ED8}" type="datetime1">
               <a:rPr lang="en-US" altLang="zh-CN" smtClean="0"/>
               <a:pPr/>
-              <a:t>10/29/2013</a:t>
+              <a:t>1/22/2015</a:t>
             </a:fld>
             <a:endParaRPr lang="en-US" altLang="zh-CN"/>
           </a:p>
@@ -2508,7 +2508,7 @@
             <a:fld id="{A7E55DFE-0527-4755-BB6D-39880D4EEC3F}" type="datetime1">
               <a:rPr lang="en-US" altLang="zh-CN" smtClean="0"/>
               <a:pPr/>
-              <a:t>10/29/2013</a:t>
+              <a:t>1/22/2015</a:t>
             </a:fld>
             <a:endParaRPr lang="en-US" altLang="zh-CN"/>
           </a:p>
@@ -2631,7 +2631,7 @@
             <a:fld id="{9B3946B1-0E50-40D2-A4DA-904E7BB39E44}" type="datetime1">
               <a:rPr lang="en-US" altLang="zh-CN" smtClean="0"/>
               <a:pPr/>
-              <a:t>10/29/2013</a:t>
+              <a:t>1/22/2015</a:t>
             </a:fld>
             <a:endParaRPr lang="en-US" altLang="zh-CN"/>
           </a:p>
@@ -2731,7 +2731,7 @@
             <a:fld id="{FEFBF8FD-DE3B-410E-B024-2E8B6DE61792}" type="datetime1">
               <a:rPr lang="en-US" altLang="zh-CN" smtClean="0"/>
               <a:pPr/>
-              <a:t>10/29/2013</a:t>
+              <a:t>1/22/2015</a:t>
             </a:fld>
             <a:endParaRPr lang="en-US" altLang="zh-CN"/>
           </a:p>
@@ -3013,7 +3013,7 @@
             <a:fld id="{D69F1300-E96E-4C0E-9464-0DC5A7E10ABB}" type="datetime1">
               <a:rPr lang="en-US" altLang="zh-CN" smtClean="0"/>
               <a:pPr/>
-              <a:t>10/29/2013</a:t>
+              <a:t>1/22/2015</a:t>
             </a:fld>
             <a:endParaRPr lang="en-US" altLang="zh-CN"/>
           </a:p>
@@ -3271,7 +3271,7 @@
             <a:fld id="{A0A6798F-100E-4C50-80C4-EE1DCA05CB61}" type="datetime1">
               <a:rPr lang="en-US" altLang="zh-CN" smtClean="0"/>
               <a:pPr/>
-              <a:t>10/29/2013</a:t>
+              <a:t>1/22/2015</a:t>
             </a:fld>
             <a:endParaRPr lang="en-US" altLang="zh-CN"/>
           </a:p>
@@ -3489,7 +3489,7 @@
             <a:fld id="{F6A09E83-29D8-4200-A961-527387F30440}" type="datetime1">
               <a:rPr lang="en-US" altLang="zh-CN" smtClean="0"/>
               <a:pPr/>
-              <a:t>10/29/2013</a:t>
+              <a:t>1/22/2015</a:t>
             </a:fld>
             <a:endParaRPr lang="en-US" altLang="zh-CN"/>
           </a:p>
@@ -3931,7 +3931,7 @@
             <a:fld id="{3E03678E-6F1D-45F3-B638-C4A5654FD474}" type="datetime1">
               <a:rPr lang="en-US" altLang="zh-CN" smtClean="0"/>
               <a:pPr/>
-              <a:t>10/29/2013</a:t>
+              <a:t>1/22/2015</a:t>
             </a:fld>
             <a:endParaRPr lang="en-US" altLang="zh-CN"/>
           </a:p>
@@ -4100,20 +4100,20 @@
           <a:p>
             <a:r>
               <a:rPr lang="en-US" dirty="0" smtClean="0"/>
-              <a:t>Basic probability</a:t>
-            </a:r>
+              <a:t>Basic </a:t>
+            </a:r>
+            <a:r>
+              <a:rPr lang="en-US" dirty="0" smtClean="0"/>
+              <a:t>Probability</a:t>
+            </a:r>
+            <a:endParaRPr lang="en-US" dirty="0" smtClean="0"/>
           </a:p>
           <a:p>
             <a:pPr algn="l"/>
             <a:r>
               <a:rPr lang="en-US" sz="1400" dirty="0" smtClean="0"/>
-              <a:t>Chapter </a:t>
-            </a:r>
-            <a:r>
-              <a:rPr lang="en-US" sz="1400" dirty="0" smtClean="0"/>
-              <a:t>4:</a:t>
-            </a:r>
-            <a:endParaRPr lang="en-US" sz="1400" dirty="0" smtClean="0"/>
+              <a:t>Chapter 4:</a:t>
+            </a:r>
           </a:p>
           <a:p>
             <a:pPr marL="342900" indent="-342900" algn="l">
@@ -4396,7 +4396,11 @@
             <a:pPr algn="l"/>
             <a:r>
               <a:rPr lang="en-US" sz="2000" dirty="0" smtClean="0"/>
-              <a:t>Discrete distribution</a:t>
+              <a:t>Discrete </a:t>
+            </a:r>
+            <a:r>
+              <a:rPr lang="en-US" sz="2000" dirty="0" smtClean="0"/>
+              <a:t>Distribution</a:t>
             </a:r>
             <a:endParaRPr lang="en-US" sz="2000" dirty="0" smtClean="0"/>
           </a:p>
@@ -4404,11 +4408,7 @@
             <a:pPr algn="l"/>
             <a:r>
               <a:rPr lang="en-US" sz="1400" dirty="0" smtClean="0"/>
-              <a:t>Chapter 5</a:t>
-            </a:r>
-            <a:r>
-              <a:rPr lang="en-US" sz="1400" dirty="0" smtClean="0"/>
-              <a:t>:</a:t>
+              <a:t>Chapter 5:</a:t>
             </a:r>
           </a:p>
           <a:p>
@@ -4420,7 +4420,6 @@
               <a:rPr lang="en-US" sz="1400" dirty="0" smtClean="0"/>
               <a:t>Random variable</a:t>
             </a:r>
-            <a:endParaRPr lang="en-US" sz="1400" dirty="0" smtClean="0"/>
           </a:p>
           <a:p>
             <a:pPr marL="285750" indent="-285750" algn="l">
@@ -4435,8 +4434,8 @@
           </a:p>
         </p:txBody>
       </p:sp>
-      <mc:AlternateContent xmlns:mc="http://schemas.openxmlformats.org/markup-compatibility/2006">
-        <mc:Choice xmlns:a14="http://schemas.microsoft.com/office/drawing/2010/main" Requires="a14">
+      <mc:AlternateContent xmlns:mc="http://schemas.openxmlformats.org/markup-compatibility/2006" xmlns:a14="http://schemas.microsoft.com/office/drawing/2010/main">
+        <mc:Choice Requires="a14">
           <p:sp>
             <p:nvSpPr>
               <p:cNvPr id="17" name="TextBox 16"/>
@@ -4541,7 +4540,7 @@
             </p:txBody>
           </p:sp>
         </mc:Choice>
-        <mc:Fallback>
+        <mc:Fallback xmlns="">
           <p:sp>
             <p:nvSpPr>
               <p:cNvPr id="17" name="TextBox 16"/>
@@ -4619,20 +4618,20 @@
               <a:p>
                 <a:r>
                   <a:rPr lang="en-US" sz="2000" dirty="0" smtClean="0"/>
-                  <a:t>Central limit theorem</a:t>
+                  <a:t>Central </a:t>
                 </a:r>
+                <a:r>
+                  <a:rPr lang="en-US" sz="2000" dirty="0" smtClean="0"/>
+                  <a:t>Limit Theorem</a:t>
+                </a:r>
+                <a:endParaRPr lang="en-US" sz="2000" dirty="0" smtClean="0"/>
               </a:p>
               <a:p>
                 <a:pPr algn="l"/>
                 <a:r>
                   <a:rPr lang="en-US" sz="1400" dirty="0" smtClean="0"/>
-                  <a:t>Chapter </a:t>
+                  <a:t>Chapter 7:</a:t>
                 </a:r>
-                <a:r>
-                  <a:rPr lang="en-US" sz="1400" dirty="0" smtClean="0"/>
-                  <a:t>7:</a:t>
-                </a:r>
-                <a:endParaRPr lang="en-US" sz="1400" dirty="0" smtClean="0"/>
               </a:p>
               <a:p>
                 <a:pPr marL="342900" indent="-342900" algn="l">
@@ -4921,8 +4920,13 @@
           <a:p>
             <a:r>
               <a:rPr lang="en-US" sz="1800" dirty="0" smtClean="0"/>
-              <a:t>Continuous distributions</a:t>
-            </a:r>
+              <a:t>Continuous </a:t>
+            </a:r>
+            <a:r>
+              <a:rPr lang="en-US" sz="1800" dirty="0" smtClean="0"/>
+              <a:t>Distributions</a:t>
+            </a:r>
+            <a:endParaRPr lang="en-US" sz="1800" dirty="0" smtClean="0"/>
           </a:p>
           <a:p>
             <a:pPr algn="l"/>
@@ -5108,9 +5112,14 @@
           <a:lstStyle/>
           <a:p>
             <a:r>
-              <a:rPr lang="en-US" dirty="0" smtClean="0"/>
-              <a:t>Linear regression</a:t>
-            </a:r>
+              <a:rPr lang="en-US" smtClean="0"/>
+              <a:t>Linear </a:t>
+            </a:r>
+            <a:r>
+              <a:rPr lang="en-US" smtClean="0"/>
+              <a:t>Regression</a:t>
+            </a:r>
+            <a:endParaRPr lang="en-US" dirty="0" smtClean="0"/>
           </a:p>
           <a:p>
             <a:pPr algn="l"/>
@@ -5153,7 +5162,6 @@
               <a:rPr lang="en-US" sz="1400" dirty="0" smtClean="0"/>
               <a:t>Multivariate regression</a:t>
             </a:r>
-            <a:endParaRPr lang="en-US" sz="1400" dirty="0" smtClean="0"/>
           </a:p>
           <a:p>
             <a:pPr marL="342900" indent="-342900" algn="l">
@@ -5162,11 +5170,7 @@
             </a:pPr>
             <a:r>
               <a:rPr lang="en-US" sz="1400" dirty="0" smtClean="0"/>
-              <a:t>Dummy variables: </a:t>
-            </a:r>
-            <a:r>
-              <a:rPr lang="en-US" sz="1400" dirty="0" smtClean="0"/>
-              <a:t>0/1</a:t>
+              <a:t>Dummy variables: 0/1</a:t>
             </a:r>
           </a:p>
           <a:p>
@@ -5178,7 +5182,6 @@
               <a:rPr lang="en-US" sz="1400" dirty="0" smtClean="0"/>
               <a:t>Regression Diagnostics</a:t>
             </a:r>
-            <a:endParaRPr lang="en-US" sz="1400" dirty="0" smtClean="0"/>
           </a:p>
         </p:txBody>
       </p:sp>
@@ -5219,8 +5222,13 @@
           <a:p>
             <a:r>
               <a:rPr lang="en-US" dirty="0" smtClean="0"/>
-              <a:t>Hypothesis testing</a:t>
-            </a:r>
+              <a:t>Hypothesis </a:t>
+            </a:r>
+            <a:r>
+              <a:rPr lang="en-US" dirty="0" smtClean="0"/>
+              <a:t>Testing</a:t>
+            </a:r>
+            <a:endParaRPr lang="en-US" dirty="0" smtClean="0"/>
           </a:p>
           <a:p>
             <a:pPr algn="l"/>
@@ -5333,11 +5341,7 @@
             </a:r>
             <a:r>
               <a:rPr lang="en-US" dirty="0" smtClean="0"/>
-              <a:t>sample </a:t>
-            </a:r>
-            <a:r>
-              <a:rPr lang="en-US" dirty="0" smtClean="0"/>
-              <a:t>tests</a:t>
+              <a:t>Sample Tests</a:t>
             </a:r>
             <a:endParaRPr lang="en-US" dirty="0" smtClean="0"/>
           </a:p>
@@ -5345,11 +5349,7 @@
             <a:pPr algn="l"/>
             <a:r>
               <a:rPr lang="en-US" sz="1400" dirty="0" smtClean="0"/>
-              <a:t>Chapter 10</a:t>
-            </a:r>
-            <a:r>
-              <a:rPr lang="en-US" sz="1400" dirty="0" smtClean="0"/>
-              <a:t>: </a:t>
+              <a:t>Chapter 10: </a:t>
             </a:r>
           </a:p>
           <a:p>
@@ -5368,10 +5368,9 @@
               <a:buChar char="•"/>
             </a:pPr>
             <a:r>
-              <a:rPr lang="en-US" sz="1400" smtClean="0"/>
+              <a:rPr lang="en-US" sz="1400" dirty="0" smtClean="0"/>
               <a:t>T-test</a:t>
             </a:r>
-            <a:endParaRPr lang="en-US" sz="1400" dirty="0" smtClean="0"/>
           </a:p>
         </p:txBody>
       </p:sp>
@@ -5385,6 +5384,13 @@
   <p:clrMapOvr>
     <a:masterClrMapping/>
   </p:clrMapOvr>
+  <p:timing>
+    <p:tnLst>
+      <p:par>
+        <p:cTn id="1" dur="indefinite" restart="never" nodeType="tmRoot"/>
+      </p:par>
+    </p:tnLst>
+  </p:timing>
 </p:sld>
 </file>
 
@@ -5396,7 +5402,7 @@
         <a:sysClr val="windowText" lastClr="000000"/>
       </a:dk1>
       <a:lt1>
-        <a:sysClr val="window" lastClr="FFFFFF"/>
+        <a:sysClr val="window" lastClr="F0F0F0"/>
       </a:lt1>
       <a:dk2>
         <a:srgbClr val="1F497D"/>

</xml_diff>